<commit_message>
This code is messed up
Will Fix it later.
</commit_message>
<xml_diff>
--- a/Source/Data/reports/Average_Ridership_Presentation.pptx
+++ b/Source/Data/reports/Average_Ridership_Presentation.pptx
@@ -6,6 +6,7 @@
   </p:sldMasterIdLst>
   <p:sldIdLst>
     <p:sldId id="256" r:id="rId7"/>
+    <p:sldId id="257" r:id="rId8"/>
   </p:sldIdLst>
   <p:sldSz cx="9144000" cy="6858000" type="screen4x3"/>
   <p:notesSz cx="6858000" cy="9144000"/>
@@ -3104,14 +3105,77 @@
           <a:lstStyle/>
           <a:p>
             <a:r>
-              <a:t>Average Ridership Per Hour (2023 vs 2024)</a:t>
+              <a:t>Average Ridership Per Hour - 2023</a:t>
             </a:r>
           </a:p>
         </p:txBody>
       </p:sp>
       <p:pic>
         <p:nvPicPr>
-          <p:cNvPr id="3" name="Picture 2" descr="Average_Ridership_Per_Hour_2023_2024.png"/>
+          <p:cNvPr id="3" name="Picture 2" descr="Average_Ridership_Per_Hour_2023.png"/>
+          <p:cNvPicPr>
+            <a:picLocks noChangeAspect="1"/>
+          </p:cNvPicPr>
+          <p:nvPr/>
+        </p:nvPicPr>
+        <p:blipFill>
+          <a:blip r:embed="rId2"/>
+          <a:stretch>
+            <a:fillRect/>
+          </a:stretch>
+        </p:blipFill>
+        <p:spPr>
+          <a:xfrm>
+            <a:off x="914400" y="1371600"/>
+            <a:ext cx="7620000" cy="4572000"/>
+          </a:xfrm>
+          <a:prstGeom prst="rect">
+            <a:avLst/>
+          </a:prstGeom>
+        </p:spPr>
+      </p:pic>
+    </p:spTree>
+  </p:cSld>
+  <p:clrMapOvr>
+    <a:masterClrMapping/>
+  </p:clrMapOvr>
+</p:sld>
+</file>
+
+<file path=ppt/slides/slide2.xml><?xml version="1.0" encoding="utf-8"?>
+<p:sld xmlns:a="http://schemas.openxmlformats.org/drawingml/2006/main" xmlns:p="http://schemas.openxmlformats.org/presentationml/2006/main" xmlns:r="http://schemas.openxmlformats.org/officeDocument/2006/relationships">
+  <p:cSld>
+    <p:spTree>
+      <p:nvGrpSpPr>
+        <p:cNvPr id="1" name=""/>
+        <p:cNvGrpSpPr/>
+        <p:nvPr/>
+      </p:nvGrpSpPr>
+      <p:grpSpPr/>
+      <p:sp>
+        <p:nvSpPr>
+          <p:cNvPr id="2" name="Title 1"/>
+          <p:cNvSpPr>
+            <a:spLocks noGrp="1"/>
+          </p:cNvSpPr>
+          <p:nvPr>
+            <p:ph type="title"/>
+          </p:nvPr>
+        </p:nvSpPr>
+        <p:spPr/>
+        <p:txBody>
+          <a:bodyPr/>
+          <a:lstStyle/>
+          <a:p>
+            <a:r>
+              <a:t>Average Ridership Per Hour - 2024</a:t>
+            </a:r>
+          </a:p>
+        </p:txBody>
+      </p:sp>
+      <p:pic>
+        <p:nvPicPr>
+          <p:cNvPr id="3" name="Picture 2" descr="Average_Ridership_Per_Hour_2024.png"/>
           <p:cNvPicPr>
             <a:picLocks noChangeAspect="1"/>
           </p:cNvPicPr>

</xml_diff>

<commit_message>
Still need to work on this
Need to Fix the Charts and have them output the hours correctly. The hours are in proper order. Second, I need to Have it put the Ridership for each Year in different tabs for each year. Also need to supress that parse warning as well.
</commit_message>
<xml_diff>
--- a/Source/Data/reports/Average_Ridership_Presentation.pptx
+++ b/Source/Data/reports/Average_Ridership_Presentation.pptx
@@ -3103,11 +3103,7 @@
         <p:txBody>
           <a:bodyPr/>
           <a:lstStyle/>
-          <a:p>
-            <a:r>
-              <a:t>Average Ridership Per Hour - 2023</a:t>
-            </a:r>
-          </a:p>
+          <a:p/>
         </p:txBody>
       </p:sp>
       <p:pic>
@@ -3127,7 +3123,7 @@
         <p:spPr>
           <a:xfrm>
             <a:off x="914400" y="1371600"/>
-            <a:ext cx="7620000" cy="4572000"/>
+            <a:ext cx="7663912" cy="4572000"/>
           </a:xfrm>
           <a:prstGeom prst="rect">
             <a:avLst/>
@@ -3166,11 +3162,7 @@
         <p:txBody>
           <a:bodyPr/>
           <a:lstStyle/>
-          <a:p>
-            <a:r>
-              <a:t>Average Ridership Per Hour - 2024</a:t>
-            </a:r>
-          </a:p>
+          <a:p/>
         </p:txBody>
       </p:sp>
       <p:pic>
@@ -3190,7 +3182,7 @@
         <p:spPr>
           <a:xfrm>
             <a:off x="914400" y="1371600"/>
-            <a:ext cx="7620000" cy="4572000"/>
+            <a:ext cx="7663912" cy="4572000"/>
           </a:xfrm>
           <a:prstGeom prst="rect">
             <a:avLst/>

</xml_diff>